<commit_message>
start to implement correlation coefficient into loss function
</commit_message>
<xml_diff>
--- a/Netzwerk_Architekturen.pptx
+++ b/Netzwerk_Architekturen.pptx
@@ -17,6 +17,7 @@
     <p:sldId id="267" r:id="rId11"/>
     <p:sldId id="268" r:id="rId12"/>
     <p:sldId id="269" r:id="rId13"/>
+    <p:sldId id="270" r:id="rId14"/>
   </p:sldIdLst>
   <p:sldSz cx="12192000" cy="6858000"/>
   <p:notesSz cx="6858000" cy="9144000"/>
@@ -536,7 +537,7 @@
           <a:p>
             <a:fld id="{41C882D0-7AD0-4A77-B3B8-06982F52EC41}" type="datetimeFigureOut">
               <a:rPr lang="de-DE" smtClean="0"/>
-              <a:t>24.02.2022</a:t>
+              <a:t>17.03.2022</a:t>
             </a:fld>
             <a:endParaRPr lang="de-DE"/>
           </a:p>
@@ -704,7 +705,7 @@
           <a:p>
             <a:fld id="{41C882D0-7AD0-4A77-B3B8-06982F52EC41}" type="datetimeFigureOut">
               <a:rPr lang="de-DE" smtClean="0"/>
-              <a:t>24.02.2022</a:t>
+              <a:t>17.03.2022</a:t>
             </a:fld>
             <a:endParaRPr lang="de-DE"/>
           </a:p>
@@ -882,7 +883,7 @@
           <a:p>
             <a:fld id="{41C882D0-7AD0-4A77-B3B8-06982F52EC41}" type="datetimeFigureOut">
               <a:rPr lang="de-DE" smtClean="0"/>
-              <a:t>24.02.2022</a:t>
+              <a:t>17.03.2022</a:t>
             </a:fld>
             <a:endParaRPr lang="de-DE"/>
           </a:p>
@@ -1050,7 +1051,7 @@
           <a:p>
             <a:fld id="{41C882D0-7AD0-4A77-B3B8-06982F52EC41}" type="datetimeFigureOut">
               <a:rPr lang="de-DE" smtClean="0"/>
-              <a:t>24.02.2022</a:t>
+              <a:t>17.03.2022</a:t>
             </a:fld>
             <a:endParaRPr lang="de-DE"/>
           </a:p>
@@ -1295,7 +1296,7 @@
           <a:p>
             <a:fld id="{41C882D0-7AD0-4A77-B3B8-06982F52EC41}" type="datetimeFigureOut">
               <a:rPr lang="de-DE" smtClean="0"/>
-              <a:t>24.02.2022</a:t>
+              <a:t>17.03.2022</a:t>
             </a:fld>
             <a:endParaRPr lang="de-DE"/>
           </a:p>
@@ -1524,7 +1525,7 @@
           <a:p>
             <a:fld id="{41C882D0-7AD0-4A77-B3B8-06982F52EC41}" type="datetimeFigureOut">
               <a:rPr lang="de-DE" smtClean="0"/>
-              <a:t>24.02.2022</a:t>
+              <a:t>17.03.2022</a:t>
             </a:fld>
             <a:endParaRPr lang="de-DE"/>
           </a:p>
@@ -1888,7 +1889,7 @@
           <a:p>
             <a:fld id="{41C882D0-7AD0-4A77-B3B8-06982F52EC41}" type="datetimeFigureOut">
               <a:rPr lang="de-DE" smtClean="0"/>
-              <a:t>24.02.2022</a:t>
+              <a:t>17.03.2022</a:t>
             </a:fld>
             <a:endParaRPr lang="de-DE"/>
           </a:p>
@@ -2005,7 +2006,7 @@
           <a:p>
             <a:fld id="{41C882D0-7AD0-4A77-B3B8-06982F52EC41}" type="datetimeFigureOut">
               <a:rPr lang="de-DE" smtClean="0"/>
-              <a:t>24.02.2022</a:t>
+              <a:t>17.03.2022</a:t>
             </a:fld>
             <a:endParaRPr lang="de-DE"/>
           </a:p>
@@ -2100,7 +2101,7 @@
           <a:p>
             <a:fld id="{41C882D0-7AD0-4A77-B3B8-06982F52EC41}" type="datetimeFigureOut">
               <a:rPr lang="de-DE" smtClean="0"/>
-              <a:t>24.02.2022</a:t>
+              <a:t>17.03.2022</a:t>
             </a:fld>
             <a:endParaRPr lang="de-DE"/>
           </a:p>
@@ -2375,7 +2376,7 @@
           <a:p>
             <a:fld id="{41C882D0-7AD0-4A77-B3B8-06982F52EC41}" type="datetimeFigureOut">
               <a:rPr lang="de-DE" smtClean="0"/>
-              <a:t>24.02.2022</a:t>
+              <a:t>17.03.2022</a:t>
             </a:fld>
             <a:endParaRPr lang="de-DE"/>
           </a:p>
@@ -2627,7 +2628,7 @@
           <a:p>
             <a:fld id="{41C882D0-7AD0-4A77-B3B8-06982F52EC41}" type="datetimeFigureOut">
               <a:rPr lang="de-DE" smtClean="0"/>
-              <a:t>24.02.2022</a:t>
+              <a:t>17.03.2022</a:t>
             </a:fld>
             <a:endParaRPr lang="de-DE"/>
           </a:p>
@@ -2838,7 +2839,7 @@
           <a:p>
             <a:fld id="{41C882D0-7AD0-4A77-B3B8-06982F52EC41}" type="datetimeFigureOut">
               <a:rPr lang="de-DE" smtClean="0"/>
-              <a:t>24.02.2022</a:t>
+              <a:t>17.03.2022</a:t>
             </a:fld>
             <a:endParaRPr lang="de-DE"/>
           </a:p>
@@ -8715,29 +8716,205 @@
           </a:p>
         </p:txBody>
       </p:sp>
-      <p:sp>
-        <p:nvSpPr>
-          <p:cNvPr id="3" name="Inhaltsplatzhalter 2"/>
+      <p:pic>
+        <p:nvPicPr>
+          <p:cNvPr id="4" name="Inhaltsplatzhalter 3"/>
+          <p:cNvPicPr>
+            <a:picLocks noGrp="1" noChangeAspect="1"/>
+          </p:cNvPicPr>
+          <p:nvPr>
+            <p:ph idx="1"/>
+          </p:nvPr>
+        </p:nvPicPr>
+        <p:blipFill>
+          <a:blip r:embed="rId2">
+            <a:extLst>
+              <a:ext uri="{28A0092B-C50C-407E-A947-70E740481C1C}">
+                <a14:useLocalDpi xmlns:a14="http://schemas.microsoft.com/office/drawing/2010/main" val="0"/>
+              </a:ext>
+            </a:extLst>
+          </a:blip>
+          <a:stretch>
+            <a:fillRect/>
+          </a:stretch>
+        </p:blipFill>
+        <p:spPr>
+          <a:xfrm>
+            <a:off x="6447223" y="1559179"/>
+            <a:ext cx="5076561" cy="4351338"/>
+          </a:xfrm>
+        </p:spPr>
+      </p:pic>
+      <p:pic>
+        <p:nvPicPr>
+          <p:cNvPr id="5" name="Grafik 4"/>
+          <p:cNvPicPr>
+            <a:picLocks noChangeAspect="1"/>
+          </p:cNvPicPr>
+          <p:nvPr/>
+        </p:nvPicPr>
+        <p:blipFill>
+          <a:blip r:embed="rId3" cstate="print">
+            <a:extLst>
+              <a:ext uri="{28A0092B-C50C-407E-A947-70E740481C1C}">
+                <a14:useLocalDpi xmlns:a14="http://schemas.microsoft.com/office/drawing/2010/main" val="0"/>
+              </a:ext>
+            </a:extLst>
+          </a:blip>
+          <a:stretch>
+            <a:fillRect/>
+          </a:stretch>
+        </p:blipFill>
+        <p:spPr>
+          <a:xfrm>
+            <a:off x="1024128" y="1581436"/>
+            <a:ext cx="4785360" cy="4306824"/>
+          </a:xfrm>
+          <a:prstGeom prst="rect">
+            <a:avLst/>
+          </a:prstGeom>
+        </p:spPr>
+      </p:pic>
+    </p:spTree>
+    <p:extLst>
+      <p:ext uri="{BB962C8B-B14F-4D97-AF65-F5344CB8AC3E}">
+        <p14:creationId xmlns:p14="http://schemas.microsoft.com/office/powerpoint/2010/main" val="960948845"/>
+      </p:ext>
+    </p:extLst>
+  </p:cSld>
+  <p:clrMapOvr>
+    <a:masterClrMapping/>
+  </p:clrMapOvr>
+</p:sld>
+</file>
+
+<file path=ppt/slides/slide13.xml><?xml version="1.0" encoding="utf-8"?>
+<p:sld xmlns:a="http://schemas.openxmlformats.org/drawingml/2006/main" xmlns:r="http://schemas.openxmlformats.org/officeDocument/2006/relationships" xmlns:p="http://schemas.openxmlformats.org/presentationml/2006/main">
+  <p:cSld>
+    <p:spTree>
+      <p:nvGrpSpPr>
+        <p:cNvPr id="1" name=""/>
+        <p:cNvGrpSpPr/>
+        <p:nvPr/>
+      </p:nvGrpSpPr>
+      <p:grpSpPr>
+        <a:xfrm>
+          <a:off x="0" y="0"/>
+          <a:ext cx="0" cy="0"/>
+          <a:chOff x="0" y="0"/>
+          <a:chExt cx="0" cy="0"/>
+        </a:xfrm>
+      </p:grpSpPr>
+      <p:sp>
+        <p:nvSpPr>
+          <p:cNvPr id="2" name="Titel 1"/>
           <p:cNvSpPr>
             <a:spLocks noGrp="1"/>
           </p:cNvSpPr>
           <p:nvPr>
+            <p:ph type="title"/>
+          </p:nvPr>
+        </p:nvSpPr>
+        <p:spPr/>
+        <p:txBody>
+          <a:bodyPr/>
+          <a:lstStyle/>
+          <a:p>
+            <a:r>
+              <a:rPr lang="de-DE" dirty="0" err="1" smtClean="0"/>
+              <a:t>Testing</a:t>
+            </a:r>
+            <a:r>
+              <a:rPr lang="de-DE" dirty="0" smtClean="0"/>
+              <a:t> Models </a:t>
+            </a:r>
+            <a:r>
+              <a:rPr lang="de-DE" dirty="0" err="1" smtClean="0"/>
+              <a:t>and</a:t>
+            </a:r>
+            <a:r>
+              <a:rPr lang="de-DE" dirty="0" smtClean="0"/>
+              <a:t> </a:t>
+            </a:r>
+            <a:r>
+              <a:rPr lang="de-DE" dirty="0" err="1" smtClean="0"/>
+              <a:t>Visualizing</a:t>
+            </a:r>
+            <a:r>
+              <a:rPr lang="de-DE" dirty="0" smtClean="0"/>
+              <a:t> </a:t>
+            </a:r>
+            <a:r>
+              <a:rPr lang="de-DE" dirty="0" err="1" smtClean="0"/>
+              <a:t>Results</a:t>
+            </a:r>
+            <a:endParaRPr lang="de-DE" dirty="0"/>
+          </a:p>
+        </p:txBody>
+      </p:sp>
+      <p:pic>
+        <p:nvPicPr>
+          <p:cNvPr id="6" name="Inhaltsplatzhalter 5"/>
+          <p:cNvPicPr>
+            <a:picLocks noGrp="1" noChangeAspect="1"/>
+          </p:cNvPicPr>
+          <p:nvPr>
             <p:ph idx="1"/>
           </p:nvPr>
-        </p:nvSpPr>
-        <p:spPr/>
-        <p:txBody>
-          <a:bodyPr/>
-          <a:lstStyle/>
-          <a:p>
-            <a:endParaRPr lang="de-DE" dirty="0"/>
-          </a:p>
-        </p:txBody>
-      </p:sp>
+        </p:nvPicPr>
+        <p:blipFill>
+          <a:blip r:embed="rId2" cstate="print">
+            <a:extLst>
+              <a:ext uri="{28A0092B-C50C-407E-A947-70E740481C1C}">
+                <a14:useLocalDpi xmlns:a14="http://schemas.microsoft.com/office/drawing/2010/main" val="0"/>
+              </a:ext>
+            </a:extLst>
+          </a:blip>
+          <a:stretch>
+            <a:fillRect/>
+          </a:stretch>
+        </p:blipFill>
+        <p:spPr>
+          <a:xfrm>
+            <a:off x="1026830" y="1939474"/>
+            <a:ext cx="4834820" cy="4351338"/>
+          </a:xfrm>
+        </p:spPr>
+      </p:pic>
+      <p:pic>
+        <p:nvPicPr>
+          <p:cNvPr id="7" name="Grafik 6"/>
+          <p:cNvPicPr>
+            <a:picLocks noChangeAspect="1"/>
+          </p:cNvPicPr>
+          <p:nvPr/>
+        </p:nvPicPr>
+        <p:blipFill>
+          <a:blip r:embed="rId3">
+            <a:extLst>
+              <a:ext uri="{28A0092B-C50C-407E-A947-70E740481C1C}">
+                <a14:useLocalDpi xmlns:a14="http://schemas.microsoft.com/office/drawing/2010/main" val="0"/>
+              </a:ext>
+            </a:extLst>
+          </a:blip>
+          <a:stretch>
+            <a:fillRect/>
+          </a:stretch>
+        </p:blipFill>
+        <p:spPr>
+          <a:xfrm>
+            <a:off x="6096000" y="1262558"/>
+            <a:ext cx="6400000" cy="5485714"/>
+          </a:xfrm>
+          <a:prstGeom prst="rect">
+            <a:avLst/>
+          </a:prstGeom>
+        </p:spPr>
+      </p:pic>
     </p:spTree>
     <p:extLst>
       <p:ext uri="{BB962C8B-B14F-4D97-AF65-F5344CB8AC3E}">
-        <p14:creationId xmlns:p14="http://schemas.microsoft.com/office/powerpoint/2010/main" val="960948845"/>
+        <p14:creationId xmlns:p14="http://schemas.microsoft.com/office/powerpoint/2010/main" val="2520971303"/>
       </p:ext>
     </p:extLst>
   </p:cSld>

</xml_diff>